<commit_message>
Python DAQ, new CSV files, and Analsys.py change
Added a GUI to the python daq so that user can enter sample info.  Also, csv auto saved in correct folder.  Changed analysis accuracy method so that instead in incremeting angle of min accuracy by 1, increment by 0.2 to get a more accurate reflection.
</commit_message>
<xml_diff>
--- a/kinematic presentations/3_27_25.pptx
+++ b/kinematic presentations/3_27_25.pptx
@@ -13,10 +13,11 @@
     <p:sldId id="264" r:id="rId7"/>
     <p:sldId id="263" r:id="rId8"/>
     <p:sldId id="269" r:id="rId9"/>
-    <p:sldId id="260" r:id="rId10"/>
-    <p:sldId id="261" r:id="rId11"/>
-    <p:sldId id="262" r:id="rId12"/>
-    <p:sldId id="267" r:id="rId13"/>
+    <p:sldId id="270" r:id="rId10"/>
+    <p:sldId id="260" r:id="rId11"/>
+    <p:sldId id="261" r:id="rId12"/>
+    <p:sldId id="262" r:id="rId13"/>
+    <p:sldId id="267" r:id="rId14"/>
   </p:sldIdLst>
   <p:sldSz cx="12192000" cy="6858000"/>
   <p:notesSz cx="6858000" cy="9144000"/>
@@ -126,7 +127,7 @@
 <file path=ppt/revisionInfo.xml><?xml version="1.0" encoding="utf-8"?>
 <p1510:revInfo xmlns:a="http://schemas.openxmlformats.org/drawingml/2006/main" xmlns:r="http://schemas.openxmlformats.org/officeDocument/2006/relationships" xmlns:p1510="http://schemas.microsoft.com/office/powerpoint/2015/10/main">
   <p1510:revLst>
-    <p1510:client id="{B038CA70-2003-4CAB-A470-D5763C6E48CF}" v="64" dt="2025-04-09T17:25:35.488"/>
+    <p1510:client id="{B038CA70-2003-4CAB-A470-D5763C6E48CF}" v="66" dt="2025-04-09T18:13:24.615"/>
   </p1510:revLst>
 </p1510:revInfo>
 </file>
@@ -136,7 +137,7 @@
   <pc:docChgLst>
     <pc:chgData name="Oppenheim, Tomas" userId="7bbdd6b4-1f3d-4fdd-ac21-d8c716941374" providerId="ADAL" clId="{B038CA70-2003-4CAB-A470-D5763C6E48CF}"/>
     <pc:docChg chg="undo custSel addSld delSld modSld sldOrd">
-      <pc:chgData name="Oppenheim, Tomas" userId="7bbdd6b4-1f3d-4fdd-ac21-d8c716941374" providerId="ADAL" clId="{B038CA70-2003-4CAB-A470-D5763C6E48CF}" dt="2025-04-09T17:25:35.487" v="2009"/>
+      <pc:chgData name="Oppenheim, Tomas" userId="7bbdd6b4-1f3d-4fdd-ac21-d8c716941374" providerId="ADAL" clId="{B038CA70-2003-4CAB-A470-D5763C6E48CF}" dt="2025-04-09T18:15:31.706" v="2494" actId="20577"/>
       <pc:docMkLst>
         <pc:docMk/>
       </pc:docMkLst>
@@ -164,7 +165,7 @@
         </pc:picChg>
       </pc:sldChg>
       <pc:sldChg chg="addSp delSp modSp add mod">
-        <pc:chgData name="Oppenheim, Tomas" userId="7bbdd6b4-1f3d-4fdd-ac21-d8c716941374" providerId="ADAL" clId="{B038CA70-2003-4CAB-A470-D5763C6E48CF}" dt="2025-04-09T14:58:20.025" v="904" actId="20577"/>
+        <pc:chgData name="Oppenheim, Tomas" userId="7bbdd6b4-1f3d-4fdd-ac21-d8c716941374" providerId="ADAL" clId="{B038CA70-2003-4CAB-A470-D5763C6E48CF}" dt="2025-04-09T18:12:57.166" v="2392" actId="1076"/>
         <pc:sldMkLst>
           <pc:docMk/>
           <pc:sldMk cId="289257297" sldId="260"/>
@@ -185,6 +186,14 @@
             <ac:spMk id="7" creationId="{D76A7EDB-7D75-6EF0-618A-F6FA99A6A4E2}"/>
           </ac:spMkLst>
         </pc:spChg>
+        <pc:spChg chg="add mod">
+          <ac:chgData name="Oppenheim, Tomas" userId="7bbdd6b4-1f3d-4fdd-ac21-d8c716941374" providerId="ADAL" clId="{B038CA70-2003-4CAB-A470-D5763C6E48CF}" dt="2025-04-09T18:12:57.166" v="2392" actId="1076"/>
+          <ac:spMkLst>
+            <pc:docMk/>
+            <pc:sldMk cId="289257297" sldId="260"/>
+            <ac:spMk id="8" creationId="{865A04EC-09E6-7E2A-659C-4F8C7A8F6065}"/>
+          </ac:spMkLst>
+        </pc:spChg>
         <pc:spChg chg="del">
           <ac:chgData name="Oppenheim, Tomas" userId="7bbdd6b4-1f3d-4fdd-ac21-d8c716941374" providerId="ADAL" clId="{B038CA70-2003-4CAB-A470-D5763C6E48CF}" dt="2025-04-09T12:41:07.479" v="8" actId="478"/>
           <ac:spMkLst>
@@ -265,6 +274,14 @@
             <ac:picMk id="8" creationId="{7932D1C9-AE9C-4254-6F67-947E7F97347E}"/>
           </ac:picMkLst>
         </pc:picChg>
+        <pc:cxnChg chg="add mod">
+          <ac:chgData name="Oppenheim, Tomas" userId="7bbdd6b4-1f3d-4fdd-ac21-d8c716941374" providerId="ADAL" clId="{B038CA70-2003-4CAB-A470-D5763C6E48CF}" dt="2025-04-09T18:12:50.638" v="2389" actId="1076"/>
+          <ac:cxnSpMkLst>
+            <pc:docMk/>
+            <pc:sldMk cId="289257297" sldId="260"/>
+            <ac:cxnSpMk id="4" creationId="{9BE17732-4B80-DC2E-63A2-60A29001A06D}"/>
+          </ac:cxnSpMkLst>
+        </pc:cxnChg>
       </pc:sldChg>
       <pc:sldChg chg="addSp delSp modSp new mod">
         <pc:chgData name="Oppenheim, Tomas" userId="7bbdd6b4-1f3d-4fdd-ac21-d8c716941374" providerId="ADAL" clId="{B038CA70-2003-4CAB-A470-D5763C6E48CF}" dt="2025-04-09T12:46:18.658" v="216" actId="1076"/>
@@ -337,11 +354,19 @@
         </pc:picChg>
       </pc:sldChg>
       <pc:sldChg chg="addSp delSp modSp new mod">
-        <pc:chgData name="Oppenheim, Tomas" userId="7bbdd6b4-1f3d-4fdd-ac21-d8c716941374" providerId="ADAL" clId="{B038CA70-2003-4CAB-A470-D5763C6E48CF}" dt="2025-04-09T14:52:23.629" v="902" actId="14100"/>
+        <pc:chgData name="Oppenheim, Tomas" userId="7bbdd6b4-1f3d-4fdd-ac21-d8c716941374" providerId="ADAL" clId="{B038CA70-2003-4CAB-A470-D5763C6E48CF}" dt="2025-04-09T18:13:49.888" v="2457" actId="1076"/>
         <pc:sldMkLst>
           <pc:docMk/>
           <pc:sldMk cId="936320411" sldId="263"/>
         </pc:sldMkLst>
+        <pc:spChg chg="add mod">
+          <ac:chgData name="Oppenheim, Tomas" userId="7bbdd6b4-1f3d-4fdd-ac21-d8c716941374" providerId="ADAL" clId="{B038CA70-2003-4CAB-A470-D5763C6E48CF}" dt="2025-04-09T18:13:49.888" v="2457" actId="1076"/>
+          <ac:spMkLst>
+            <pc:docMk/>
+            <pc:sldMk cId="936320411" sldId="263"/>
+            <ac:spMk id="2" creationId="{ACCC6E6A-E1AF-1328-896A-5048161B7BE6}"/>
+          </ac:spMkLst>
+        </pc:spChg>
         <pc:spChg chg="del">
           <ac:chgData name="Oppenheim, Tomas" userId="7bbdd6b4-1f3d-4fdd-ac21-d8c716941374" providerId="ADAL" clId="{B038CA70-2003-4CAB-A470-D5763C6E48CF}" dt="2025-04-09T14:09:52.972" v="224" actId="478"/>
           <ac:spMkLst>
@@ -407,7 +432,7 @@
           </ac:spMkLst>
         </pc:spChg>
         <pc:picChg chg="add del mod">
-          <ac:chgData name="Oppenheim, Tomas" userId="7bbdd6b4-1f3d-4fdd-ac21-d8c716941374" providerId="ADAL" clId="{B038CA70-2003-4CAB-A470-D5763C6E48CF}" dt="2025-04-09T14:50:22.819" v="853" actId="1076"/>
+          <ac:chgData name="Oppenheim, Tomas" userId="7bbdd6b4-1f3d-4fdd-ac21-d8c716941374" providerId="ADAL" clId="{B038CA70-2003-4CAB-A470-D5763C6E48CF}" dt="2025-04-09T18:13:45.911" v="2456" actId="1076"/>
           <ac:picMkLst>
             <pc:docMk/>
             <pc:sldMk cId="936320411" sldId="263"/>
@@ -1219,17 +1244,72 @@
         </pc:spChg>
       </pc:sldChg>
       <pc:sldChg chg="addSp modSp add mod">
-        <pc:chgData name="Oppenheim, Tomas" userId="7bbdd6b4-1f3d-4fdd-ac21-d8c716941374" providerId="ADAL" clId="{B038CA70-2003-4CAB-A470-D5763C6E48CF}" dt="2025-04-09T17:20:08.740" v="2008" actId="20577"/>
+        <pc:chgData name="Oppenheim, Tomas" userId="7bbdd6b4-1f3d-4fdd-ac21-d8c716941374" providerId="ADAL" clId="{B038CA70-2003-4CAB-A470-D5763C6E48CF}" dt="2025-04-09T17:49:31.473" v="2143" actId="20577"/>
         <pc:sldMkLst>
           <pc:docMk/>
           <pc:sldMk cId="3693646682" sldId="269"/>
         </pc:sldMkLst>
         <pc:spChg chg="add mod">
-          <ac:chgData name="Oppenheim, Tomas" userId="7bbdd6b4-1f3d-4fdd-ac21-d8c716941374" providerId="ADAL" clId="{B038CA70-2003-4CAB-A470-D5763C6E48CF}" dt="2025-04-09T17:20:08.740" v="2008" actId="20577"/>
+          <ac:chgData name="Oppenheim, Tomas" userId="7bbdd6b4-1f3d-4fdd-ac21-d8c716941374" providerId="ADAL" clId="{B038CA70-2003-4CAB-A470-D5763C6E48CF}" dt="2025-04-09T17:48:12.362" v="2119" actId="207"/>
           <ac:spMkLst>
             <pc:docMk/>
             <pc:sldMk cId="3693646682" sldId="269"/>
             <ac:spMk id="5" creationId="{D22FB1FB-EF49-186C-06A0-9F5AC155AEC4}"/>
+          </ac:spMkLst>
+        </pc:spChg>
+        <pc:spChg chg="mod">
+          <ac:chgData name="Oppenheim, Tomas" userId="7bbdd6b4-1f3d-4fdd-ac21-d8c716941374" providerId="ADAL" clId="{B038CA70-2003-4CAB-A470-D5763C6E48CF}" dt="2025-04-09T17:49:31.473" v="2143" actId="20577"/>
+          <ac:spMkLst>
+            <pc:docMk/>
+            <pc:sldMk cId="3693646682" sldId="269"/>
+            <ac:spMk id="17" creationId="{80776BA2-8832-BD85-F394-46D2CC02D2CA}"/>
+          </ac:spMkLst>
+        </pc:spChg>
+        <pc:spChg chg="mod">
+          <ac:chgData name="Oppenheim, Tomas" userId="7bbdd6b4-1f3d-4fdd-ac21-d8c716941374" providerId="ADAL" clId="{B038CA70-2003-4CAB-A470-D5763C6E48CF}" dt="2025-04-09T17:49:04.402" v="2120" actId="1076"/>
+          <ac:spMkLst>
+            <pc:docMk/>
+            <pc:sldMk cId="3693646682" sldId="269"/>
+            <ac:spMk id="20" creationId="{12D06E10-2F38-0C96-67F7-3F87B49AA9C2}"/>
+          </ac:spMkLst>
+        </pc:spChg>
+        <pc:spChg chg="mod">
+          <ac:chgData name="Oppenheim, Tomas" userId="7bbdd6b4-1f3d-4fdd-ac21-d8c716941374" providerId="ADAL" clId="{B038CA70-2003-4CAB-A470-D5763C6E48CF}" dt="2025-04-09T17:43:32.672" v="2049" actId="113"/>
+          <ac:spMkLst>
+            <pc:docMk/>
+            <pc:sldMk cId="3693646682" sldId="269"/>
+            <ac:spMk id="42" creationId="{1C8A7CF6-3643-C3C9-CEFD-CB8DBB024B11}"/>
+          </ac:spMkLst>
+        </pc:spChg>
+      </pc:sldChg>
+      <pc:sldChg chg="addSp delSp modSp new mod">
+        <pc:chgData name="Oppenheim, Tomas" userId="7bbdd6b4-1f3d-4fdd-ac21-d8c716941374" providerId="ADAL" clId="{B038CA70-2003-4CAB-A470-D5763C6E48CF}" dt="2025-04-09T18:15:31.706" v="2494" actId="20577"/>
+        <pc:sldMkLst>
+          <pc:docMk/>
+          <pc:sldMk cId="2828774177" sldId="270"/>
+        </pc:sldMkLst>
+        <pc:spChg chg="mod">
+          <ac:chgData name="Oppenheim, Tomas" userId="7bbdd6b4-1f3d-4fdd-ac21-d8c716941374" providerId="ADAL" clId="{B038CA70-2003-4CAB-A470-D5763C6E48CF}" dt="2025-04-09T18:15:31.706" v="2494" actId="20577"/>
+          <ac:spMkLst>
+            <pc:docMk/>
+            <pc:sldMk cId="2828774177" sldId="270"/>
+            <ac:spMk id="2" creationId="{6B71AADF-4E98-4534-2491-27BD42DBD491}"/>
+          </ac:spMkLst>
+        </pc:spChg>
+        <pc:spChg chg="del">
+          <ac:chgData name="Oppenheim, Tomas" userId="7bbdd6b4-1f3d-4fdd-ac21-d8c716941374" providerId="ADAL" clId="{B038CA70-2003-4CAB-A470-D5763C6E48CF}" dt="2025-04-09T18:07:40.545" v="2152" actId="478"/>
+          <ac:spMkLst>
+            <pc:docMk/>
+            <pc:sldMk cId="2828774177" sldId="270"/>
+            <ac:spMk id="3" creationId="{3E8DE7B5-BD01-9438-DBA3-F812EF7797ED}"/>
+          </ac:spMkLst>
+        </pc:spChg>
+        <pc:spChg chg="add mod">
+          <ac:chgData name="Oppenheim, Tomas" userId="7bbdd6b4-1f3d-4fdd-ac21-d8c716941374" providerId="ADAL" clId="{B038CA70-2003-4CAB-A470-D5763C6E48CF}" dt="2025-04-09T18:08:07.076" v="2157" actId="1076"/>
+          <ac:spMkLst>
+            <pc:docMk/>
+            <pc:sldMk cId="2828774177" sldId="270"/>
+            <ac:spMk id="5" creationId="{0799B6C1-493E-BBD0-67D5-5ED6A2DEEFBB}"/>
           </ac:spMkLst>
         </pc:spChg>
       </pc:sldChg>
@@ -4533,7 +4613,13 @@
   <p:cSld>
     <p:spTree>
       <p:nvGrpSpPr>
-        <p:cNvPr id="1" name=""/>
+        <p:cNvPr id="1" name="">
+          <a:extLst>
+            <a:ext uri="{FF2B5EF4-FFF2-40B4-BE49-F238E27FC236}">
+              <a16:creationId xmlns:a16="http://schemas.microsoft.com/office/drawing/2014/main" id="{5FD8E3B2-E5F5-5711-234D-F8502C2437E4}"/>
+            </a:ext>
+          </a:extLst>
+        </p:cNvPr>
         <p:cNvGrpSpPr/>
         <p:nvPr/>
       </p:nvGrpSpPr>
@@ -4547,10 +4633,10 @@
       </p:grpSpPr>
       <p:pic>
         <p:nvPicPr>
-          <p:cNvPr id="5" name="Picture 4">
-            <a:extLst>
-              <a:ext uri="{FF2B5EF4-FFF2-40B4-BE49-F238E27FC236}">
-                <a16:creationId xmlns:a16="http://schemas.microsoft.com/office/drawing/2014/main" id="{3A82C5BC-9EFD-3BDB-825A-E503E88F76F2}"/>
+          <p:cNvPr id="6" name="Picture 5">
+            <a:extLst>
+              <a:ext uri="{FF2B5EF4-FFF2-40B4-BE49-F238E27FC236}">
+                <a16:creationId xmlns:a16="http://schemas.microsoft.com/office/drawing/2014/main" id="{9D3D0A59-218C-3596-0063-20B469CA1C48}"/>
               </a:ext>
             </a:extLst>
           </p:cNvPr>
@@ -4567,8 +4653,8 @@
         </p:blipFill>
         <p:spPr>
           <a:xfrm>
-            <a:off x="1128851" y="842861"/>
-            <a:ext cx="9006436" cy="5070593"/>
+            <a:off x="459240" y="1317565"/>
+            <a:ext cx="4099062" cy="5189003"/>
           </a:xfrm>
           <a:prstGeom prst="rect">
             <a:avLst/>
@@ -4577,10 +4663,53 @@
       </p:pic>
       <p:sp>
         <p:nvSpPr>
-          <p:cNvPr id="6" name="Rectangle 5">
-            <a:extLst>
-              <a:ext uri="{FF2B5EF4-FFF2-40B4-BE49-F238E27FC236}">
-                <a16:creationId xmlns:a16="http://schemas.microsoft.com/office/drawing/2014/main" id="{953AB804-FBE9-2B42-F70C-9DE27F181F02}"/>
+          <p:cNvPr id="10" name="TextBox 9">
+            <a:extLst>
+              <a:ext uri="{FF2B5EF4-FFF2-40B4-BE49-F238E27FC236}">
+                <a16:creationId xmlns:a16="http://schemas.microsoft.com/office/drawing/2014/main" id="{222041F2-67CC-5538-03EE-B6E2E3EAFF81}"/>
+              </a:ext>
+            </a:extLst>
+          </p:cNvPr>
+          <p:cNvSpPr txBox="1"/>
+          <p:nvPr/>
+        </p:nvSpPr>
+        <p:spPr>
+          <a:xfrm>
+            <a:off x="939102" y="234334"/>
+            <a:ext cx="3541888" cy="923330"/>
+          </a:xfrm>
+          <a:prstGeom prst="rect">
+            <a:avLst/>
+          </a:prstGeom>
+          <a:noFill/>
+        </p:spPr>
+        <p:txBody>
+          <a:bodyPr wrap="square" rtlCol="0">
+            <a:spAutoFit/>
+          </a:bodyPr>
+          <a:lstStyle/>
+          <a:p>
+            <a:r>
+              <a:rPr lang="en-US" b="1" dirty="0">
+                <a:solidFill>
+                  <a:srgbClr val="FF0000"/>
+                </a:solidFill>
+              </a:rPr>
+              <a:t>3.3V source from LVR and 2 x 10uF Caps</a:t>
+            </a:r>
+            <a:r>
+              <a:rPr lang="en-US" b="1" dirty="0"/>
+              <a:t>, 16 bit enc, 8x ADC gain, 50 ohm div</a:t>
+            </a:r>
+          </a:p>
+        </p:txBody>
+      </p:sp>
+      <p:sp>
+        <p:nvSpPr>
+          <p:cNvPr id="13" name="Rectangle 12">
+            <a:extLst>
+              <a:ext uri="{FF2B5EF4-FFF2-40B4-BE49-F238E27FC236}">
+                <a16:creationId xmlns:a16="http://schemas.microsoft.com/office/drawing/2014/main" id="{22C63E94-D092-C650-9D76-1E9A4B0C73C7}"/>
               </a:ext>
             </a:extLst>
           </p:cNvPr>
@@ -4589,8 +4718,8 @@
         </p:nvSpPr>
         <p:spPr>
           <a:xfrm>
-            <a:off x="7892933" y="2709949"/>
-            <a:ext cx="673331" cy="2269377"/>
+            <a:off x="3096784" y="4624455"/>
+            <a:ext cx="415636" cy="1911927"/>
           </a:xfrm>
           <a:prstGeom prst="rect">
             <a:avLst/>
@@ -4627,10 +4756,215 @@
           </a:p>
         </p:txBody>
       </p:sp>
+      <p:sp>
+        <p:nvSpPr>
+          <p:cNvPr id="2" name="TextBox 1">
+            <a:extLst>
+              <a:ext uri="{FF2B5EF4-FFF2-40B4-BE49-F238E27FC236}">
+                <a16:creationId xmlns:a16="http://schemas.microsoft.com/office/drawing/2014/main" id="{46CCF047-999B-E766-4207-6F3532811F8E}"/>
+              </a:ext>
+            </a:extLst>
+          </p:cNvPr>
+          <p:cNvSpPr txBox="1"/>
+          <p:nvPr/>
+        </p:nvSpPr>
+        <p:spPr>
+          <a:xfrm>
+            <a:off x="5792349" y="117236"/>
+            <a:ext cx="5512960" cy="1200329"/>
+          </a:xfrm>
+          <a:prstGeom prst="rect">
+            <a:avLst/>
+          </a:prstGeom>
+          <a:noFill/>
+        </p:spPr>
+        <p:txBody>
+          <a:bodyPr wrap="square" rtlCol="0">
+            <a:spAutoFit/>
+          </a:bodyPr>
+          <a:lstStyle/>
+          <a:p>
+            <a:r>
+              <a:rPr lang="en-US" b="1" dirty="0">
+                <a:solidFill>
+                  <a:srgbClr val="FF0000"/>
+                </a:solidFill>
+              </a:rPr>
+              <a:t>3.3V source from LVR and 2 x 10uF Caps</a:t>
+            </a:r>
+            <a:r>
+              <a:rPr lang="en-US" b="1" dirty="0"/>
+              <a:t>, 16 bit enc, 2x ADC gain (using diff input), 76x gain from LMC6482 (across gauge), 50 ohm div with 0.4 ohm strain gauge (see circuit)</a:t>
+            </a:r>
+          </a:p>
+        </p:txBody>
+      </p:sp>
+      <p:pic>
+        <p:nvPicPr>
+          <p:cNvPr id="5" name="Picture 4">
+            <a:extLst>
+              <a:ext uri="{FF2B5EF4-FFF2-40B4-BE49-F238E27FC236}">
+                <a16:creationId xmlns:a16="http://schemas.microsoft.com/office/drawing/2014/main" id="{7FD6E26B-2EE5-D52C-1187-6A19ED75A7FB}"/>
+              </a:ext>
+            </a:extLst>
+          </p:cNvPr>
+          <p:cNvPicPr>
+            <a:picLocks noChangeAspect="1"/>
+          </p:cNvPicPr>
+          <p:nvPr/>
+        </p:nvPicPr>
+        <p:blipFill>
+          <a:blip r:embed="rId3"/>
+          <a:stretch>
+            <a:fillRect/>
+          </a:stretch>
+        </p:blipFill>
+        <p:spPr>
+          <a:xfrm>
+            <a:off x="6292863" y="1317565"/>
+            <a:ext cx="3927636" cy="5114917"/>
+          </a:xfrm>
+          <a:prstGeom prst="rect">
+            <a:avLst/>
+          </a:prstGeom>
+        </p:spPr>
+      </p:pic>
+      <p:sp>
+        <p:nvSpPr>
+          <p:cNvPr id="7" name="Rectangle 6">
+            <a:extLst>
+              <a:ext uri="{FF2B5EF4-FFF2-40B4-BE49-F238E27FC236}">
+                <a16:creationId xmlns:a16="http://schemas.microsoft.com/office/drawing/2014/main" id="{D76A7EDB-7D75-6EF0-618A-F6FA99A6A4E2}"/>
+              </a:ext>
+            </a:extLst>
+          </p:cNvPr>
+          <p:cNvSpPr/>
+          <p:nvPr/>
+        </p:nvSpPr>
+        <p:spPr>
+          <a:xfrm>
+            <a:off x="9001591" y="4584471"/>
+            <a:ext cx="415636" cy="1911927"/>
+          </a:xfrm>
+          <a:prstGeom prst="rect">
+            <a:avLst/>
+          </a:prstGeom>
+          <a:noFill/>
+          <a:ln>
+            <a:solidFill>
+              <a:srgbClr val="FF0000"/>
+            </a:solidFill>
+          </a:ln>
+        </p:spPr>
+        <p:style>
+          <a:lnRef idx="2">
+            <a:schemeClr val="accent1">
+              <a:shade val="15000"/>
+            </a:schemeClr>
+          </a:lnRef>
+          <a:fillRef idx="1">
+            <a:schemeClr val="accent1"/>
+          </a:fillRef>
+          <a:effectRef idx="0">
+            <a:schemeClr val="accent1"/>
+          </a:effectRef>
+          <a:fontRef idx="minor">
+            <a:schemeClr val="lt1"/>
+          </a:fontRef>
+        </p:style>
+        <p:txBody>
+          <a:bodyPr rtlCol="0" anchor="ctr"/>
+          <a:lstStyle/>
+          <a:p>
+            <a:pPr algn="ctr"/>
+            <a:endParaRPr lang="en-US"/>
+          </a:p>
+        </p:txBody>
+      </p:sp>
+      <p:cxnSp>
+        <p:nvCxnSpPr>
+          <p:cNvPr id="4" name="Straight Arrow Connector 3">
+            <a:extLst>
+              <a:ext uri="{FF2B5EF4-FFF2-40B4-BE49-F238E27FC236}">
+                <a16:creationId xmlns:a16="http://schemas.microsoft.com/office/drawing/2014/main" id="{9BE17732-4B80-DC2E-63A2-60A29001A06D}"/>
+              </a:ext>
+            </a:extLst>
+          </p:cNvPr>
+          <p:cNvCxnSpPr>
+            <a:cxnSpLocks/>
+          </p:cNvCxnSpPr>
+          <p:nvPr/>
+        </p:nvCxnSpPr>
+        <p:spPr>
+          <a:xfrm>
+            <a:off x="9779924" y="2360815"/>
+            <a:ext cx="394855" cy="0"/>
+          </a:xfrm>
+          <a:prstGeom prst="straightConnector1">
+            <a:avLst/>
+          </a:prstGeom>
+          <a:ln>
+            <a:tailEnd type="triangle"/>
+          </a:ln>
+        </p:spPr>
+        <p:style>
+          <a:lnRef idx="2">
+            <a:schemeClr val="accent1"/>
+          </a:lnRef>
+          <a:fillRef idx="0">
+            <a:schemeClr val="accent1"/>
+          </a:fillRef>
+          <a:effectRef idx="1">
+            <a:schemeClr val="accent1"/>
+          </a:effectRef>
+          <a:fontRef idx="minor">
+            <a:schemeClr val="tx1"/>
+          </a:fontRef>
+        </p:style>
+      </p:cxnSp>
+      <p:sp>
+        <p:nvSpPr>
+          <p:cNvPr id="8" name="TextBox 7">
+            <a:extLst>
+              <a:ext uri="{FF2B5EF4-FFF2-40B4-BE49-F238E27FC236}">
+                <a16:creationId xmlns:a16="http://schemas.microsoft.com/office/drawing/2014/main" id="{865A04EC-09E6-7E2A-659C-4F8C7A8F6065}"/>
+              </a:ext>
+            </a:extLst>
+          </p:cNvPr>
+          <p:cNvSpPr txBox="1"/>
+          <p:nvPr/>
+        </p:nvSpPr>
+        <p:spPr>
+          <a:xfrm>
+            <a:off x="10105507" y="1554480"/>
+            <a:ext cx="2176548" cy="1477328"/>
+          </a:xfrm>
+          <a:prstGeom prst="rect">
+            <a:avLst/>
+          </a:prstGeom>
+          <a:noFill/>
+        </p:spPr>
+        <p:txBody>
+          <a:bodyPr wrap="square" rtlCol="0">
+            <a:spAutoFit/>
+          </a:bodyPr>
+          <a:lstStyle/>
+          <a:p>
+            <a:r>
+              <a:rPr lang="en-US" dirty="0" err="1"/>
+              <a:t>Bc</a:t>
+            </a:r>
+            <a:r>
+              <a:rPr lang="en-US" dirty="0"/>
+              <a:t> of breadboarding, distance from strain gauge to circuit over a foot</a:t>
+            </a:r>
+          </a:p>
+        </p:txBody>
+      </p:sp>
     </p:spTree>
     <p:extLst>
       <p:ext uri="{BB962C8B-B14F-4D97-AF65-F5344CB8AC3E}">
-        <p14:creationId xmlns:p14="http://schemas.microsoft.com/office/powerpoint/2010/main" val="319549533"/>
+        <p14:creationId xmlns:p14="http://schemas.microsoft.com/office/powerpoint/2010/main" val="289257297"/>
       </p:ext>
     </p:extLst>
   </p:cSld>
@@ -4662,6 +4996,118 @@
           <p:cNvPr id="5" name="Picture 4">
             <a:extLst>
               <a:ext uri="{FF2B5EF4-FFF2-40B4-BE49-F238E27FC236}">
+                <a16:creationId xmlns:a16="http://schemas.microsoft.com/office/drawing/2014/main" id="{3A82C5BC-9EFD-3BDB-825A-E503E88F76F2}"/>
+              </a:ext>
+            </a:extLst>
+          </p:cNvPr>
+          <p:cNvPicPr>
+            <a:picLocks noChangeAspect="1"/>
+          </p:cNvPicPr>
+          <p:nvPr/>
+        </p:nvPicPr>
+        <p:blipFill>
+          <a:blip r:embed="rId2"/>
+          <a:stretch>
+            <a:fillRect/>
+          </a:stretch>
+        </p:blipFill>
+        <p:spPr>
+          <a:xfrm>
+            <a:off x="1128851" y="842861"/>
+            <a:ext cx="9006436" cy="5070593"/>
+          </a:xfrm>
+          <a:prstGeom prst="rect">
+            <a:avLst/>
+          </a:prstGeom>
+        </p:spPr>
+      </p:pic>
+      <p:sp>
+        <p:nvSpPr>
+          <p:cNvPr id="6" name="Rectangle 5">
+            <a:extLst>
+              <a:ext uri="{FF2B5EF4-FFF2-40B4-BE49-F238E27FC236}">
+                <a16:creationId xmlns:a16="http://schemas.microsoft.com/office/drawing/2014/main" id="{953AB804-FBE9-2B42-F70C-9DE27F181F02}"/>
+              </a:ext>
+            </a:extLst>
+          </p:cNvPr>
+          <p:cNvSpPr/>
+          <p:nvPr/>
+        </p:nvSpPr>
+        <p:spPr>
+          <a:xfrm>
+            <a:off x="7892933" y="2709949"/>
+            <a:ext cx="673331" cy="2269377"/>
+          </a:xfrm>
+          <a:prstGeom prst="rect">
+            <a:avLst/>
+          </a:prstGeom>
+          <a:noFill/>
+          <a:ln>
+            <a:solidFill>
+              <a:srgbClr val="FF0000"/>
+            </a:solidFill>
+          </a:ln>
+        </p:spPr>
+        <p:style>
+          <a:lnRef idx="2">
+            <a:schemeClr val="accent1">
+              <a:shade val="15000"/>
+            </a:schemeClr>
+          </a:lnRef>
+          <a:fillRef idx="1">
+            <a:schemeClr val="accent1"/>
+          </a:fillRef>
+          <a:effectRef idx="0">
+            <a:schemeClr val="accent1"/>
+          </a:effectRef>
+          <a:fontRef idx="minor">
+            <a:schemeClr val="lt1"/>
+          </a:fontRef>
+        </p:style>
+        <p:txBody>
+          <a:bodyPr rtlCol="0" anchor="ctr"/>
+          <a:lstStyle/>
+          <a:p>
+            <a:pPr algn="ctr"/>
+            <a:endParaRPr lang="en-US"/>
+          </a:p>
+        </p:txBody>
+      </p:sp>
+    </p:spTree>
+    <p:extLst>
+      <p:ext uri="{BB962C8B-B14F-4D97-AF65-F5344CB8AC3E}">
+        <p14:creationId xmlns:p14="http://schemas.microsoft.com/office/powerpoint/2010/main" val="319549533"/>
+      </p:ext>
+    </p:extLst>
+  </p:cSld>
+  <p:clrMapOvr>
+    <a:masterClrMapping/>
+  </p:clrMapOvr>
+</p:sld>
+</file>
+
+<file path=ppt/slides/slide12.xml><?xml version="1.0" encoding="utf-8"?>
+<p:sld xmlns:a="http://schemas.openxmlformats.org/drawingml/2006/main" xmlns:r="http://schemas.openxmlformats.org/officeDocument/2006/relationships" xmlns:p="http://schemas.openxmlformats.org/presentationml/2006/main">
+  <p:cSld>
+    <p:spTree>
+      <p:nvGrpSpPr>
+        <p:cNvPr id="1" name=""/>
+        <p:cNvGrpSpPr/>
+        <p:nvPr/>
+      </p:nvGrpSpPr>
+      <p:grpSpPr>
+        <a:xfrm>
+          <a:off x="0" y="0"/>
+          <a:ext cx="0" cy="0"/>
+          <a:chOff x="0" y="0"/>
+          <a:chExt cx="0" cy="0"/>
+        </a:xfrm>
+      </p:grpSpPr>
+      <p:pic>
+        <p:nvPicPr>
+          <p:cNvPr id="5" name="Picture 4">
+            <a:extLst>
+              <a:ext uri="{FF2B5EF4-FFF2-40B4-BE49-F238E27FC236}">
                 <a16:creationId xmlns:a16="http://schemas.microsoft.com/office/drawing/2014/main" id="{4B63EF5B-1C0C-AB6B-4AE1-E34DDDDE7BA9}"/>
               </a:ext>
             </a:extLst>
@@ -4700,7 +5146,7 @@
 </p:sld>
 </file>
 
-<file path=ppt/slides/slide12.xml><?xml version="1.0" encoding="utf-8"?>
+<file path=ppt/slides/slide13.xml><?xml version="1.0" encoding="utf-8"?>
 <p:sld xmlns:a="http://schemas.openxmlformats.org/drawingml/2006/main" xmlns:r="http://schemas.openxmlformats.org/officeDocument/2006/relationships" xmlns:p="http://schemas.openxmlformats.org/presentationml/2006/main">
   <p:cSld>
     <p:spTree>
@@ -8979,6 +9425,41 @@
           </a:fontRef>
         </p:style>
       </p:cxnSp>
+      <p:sp>
+        <p:nvSpPr>
+          <p:cNvPr id="2" name="TextBox 1">
+            <a:extLst>
+              <a:ext uri="{FF2B5EF4-FFF2-40B4-BE49-F238E27FC236}">
+                <a16:creationId xmlns:a16="http://schemas.microsoft.com/office/drawing/2014/main" id="{ACCC6E6A-E1AF-1328-896A-5048161B7BE6}"/>
+              </a:ext>
+            </a:extLst>
+          </p:cNvPr>
+          <p:cNvSpPr txBox="1"/>
+          <p:nvPr/>
+        </p:nvSpPr>
+        <p:spPr>
+          <a:xfrm>
+            <a:off x="6105173" y="636121"/>
+            <a:ext cx="3694793" cy="646331"/>
+          </a:xfrm>
+          <a:prstGeom prst="rect">
+            <a:avLst/>
+          </a:prstGeom>
+          <a:noFill/>
+        </p:spPr>
+        <p:txBody>
+          <a:bodyPr wrap="square" rtlCol="0">
+            <a:spAutoFit/>
+          </a:bodyPr>
+          <a:lstStyle/>
+          <a:p>
+            <a:r>
+              <a:rPr lang="en-US" dirty="0"/>
+              <a:t>Actual Strain gauge about a foot away from this circuit</a:t>
+            </a:r>
+          </a:p>
+        </p:txBody>
+      </p:sp>
     </p:spTree>
     <p:extLst>
       <p:ext uri="{BB962C8B-B14F-4D97-AF65-F5344CB8AC3E}">
@@ -9555,8 +10036,8 @@
         </p:nvSpPr>
         <p:spPr>
           <a:xfrm>
-            <a:off x="6485309" y="1400193"/>
-            <a:ext cx="5223167" cy="369332"/>
+            <a:off x="6466613" y="1296374"/>
+            <a:ext cx="5223167" cy="646331"/>
           </a:xfrm>
           <a:prstGeom prst="rect">
             <a:avLst/>
@@ -9571,7 +10052,15 @@
           <a:p>
             <a:r>
               <a:rPr lang="en-US" dirty="0"/>
-              <a:t>~  - 1.95 mV + </a:t>
+              <a:t>~  - 1.95 mV (</a:t>
+            </a:r>
+            <a:r>
+              <a:rPr lang="en-US" b="1" dirty="0"/>
+              <a:t>order precision resistor for this</a:t>
+            </a:r>
+            <a:r>
+              <a:rPr lang="en-US" dirty="0"/>
+              <a:t>)+ </a:t>
             </a:r>
             <a:r>
               <a:rPr lang="en-US" dirty="0" err="1"/>
@@ -9945,7 +10434,7 @@
           <a:p>
             <a:r>
               <a:rPr lang="en-US" b="1" dirty="0"/>
-              <a:t>ADS112C04</a:t>
+              <a:t>ADS112C04 or NAU7802</a:t>
             </a:r>
             <a:r>
               <a:rPr lang="en-US" dirty="0"/>
@@ -10041,7 +10530,7 @@
         </p:nvSpPr>
         <p:spPr>
           <a:xfrm>
-            <a:off x="6057902" y="2002621"/>
+            <a:off x="6030191" y="1980161"/>
             <a:ext cx="760614" cy="369332"/>
           </a:xfrm>
           <a:prstGeom prst="rect">
@@ -10182,7 +10671,7 @@
         <p:spPr>
           <a:xfrm>
             <a:off x="2610373" y="5250887"/>
-            <a:ext cx="6596149" cy="369332"/>
+            <a:ext cx="6596149" cy="646331"/>
           </a:xfrm>
           <a:prstGeom prst="rect">
             <a:avLst/>
@@ -10212,6 +10701,21 @@
             <a:r>
               <a:rPr lang="en-US" b="1" dirty="0"/>
               <a:t>Using Differential ADC for Common Mode Rejection</a:t>
+            </a:r>
+          </a:p>
+          <a:p>
+            <a:pPr algn="ctr"/>
+            <a:r>
+              <a:rPr lang="en-US" b="1" dirty="0">
+                <a:solidFill>
+                  <a:srgbClr val="FF0000"/>
+                </a:solidFill>
+              </a:rPr>
+              <a:t>NAU7802</a:t>
+            </a:r>
+            <a:r>
+              <a:rPr lang="en-US" b="1" dirty="0"/>
+              <a:t> Already does this but my output was very noisy!</a:t>
             </a:r>
           </a:p>
         </p:txBody>
@@ -10234,13 +10738,7 @@
   <p:cSld>
     <p:spTree>
       <p:nvGrpSpPr>
-        <p:cNvPr id="1" name="">
-          <a:extLst>
-            <a:ext uri="{FF2B5EF4-FFF2-40B4-BE49-F238E27FC236}">
-              <a16:creationId xmlns:a16="http://schemas.microsoft.com/office/drawing/2014/main" id="{5FD8E3B2-E5F5-5711-234D-F8502C2437E4}"/>
-            </a:ext>
-          </a:extLst>
-        </p:cNvPr>
+        <p:cNvPr id="1" name=""/>
         <p:cNvGrpSpPr/>
         <p:nvPr/>
       </p:nvGrpSpPr>
@@ -10252,260 +10750,1262 @@
           <a:chExt cx="0" cy="0"/>
         </a:xfrm>
       </p:grpSpPr>
-      <p:pic>
-        <p:nvPicPr>
-          <p:cNvPr id="6" name="Picture 5">
-            <a:extLst>
-              <a:ext uri="{FF2B5EF4-FFF2-40B4-BE49-F238E27FC236}">
-                <a16:creationId xmlns:a16="http://schemas.microsoft.com/office/drawing/2014/main" id="{9D3D0A59-218C-3596-0063-20B469CA1C48}"/>
-              </a:ext>
-            </a:extLst>
-          </p:cNvPr>
-          <p:cNvPicPr>
-            <a:picLocks noChangeAspect="1"/>
-          </p:cNvPicPr>
-          <p:nvPr/>
-        </p:nvPicPr>
-        <p:blipFill>
-          <a:blip r:embed="rId2"/>
-          <a:stretch>
-            <a:fillRect/>
-          </a:stretch>
-        </p:blipFill>
-        <p:spPr>
-          <a:xfrm>
-            <a:off x="459240" y="1317565"/>
-            <a:ext cx="4099062" cy="5189003"/>
+      <p:sp>
+        <p:nvSpPr>
+          <p:cNvPr id="2" name="Title 1">
+            <a:extLst>
+              <a:ext uri="{FF2B5EF4-FFF2-40B4-BE49-F238E27FC236}">
+                <a16:creationId xmlns:a16="http://schemas.microsoft.com/office/drawing/2014/main" id="{6B71AADF-4E98-4534-2491-27BD42DBD491}"/>
+              </a:ext>
+            </a:extLst>
+          </p:cNvPr>
+          <p:cNvSpPr>
+            <a:spLocks noGrp="1"/>
+          </p:cNvSpPr>
+          <p:nvPr>
+            <p:ph type="title"/>
+          </p:nvPr>
+        </p:nvSpPr>
+        <p:spPr/>
+        <p:txBody>
+          <a:bodyPr>
+            <a:normAutofit fontScale="90000"/>
+          </a:bodyPr>
+          <a:lstStyle/>
+          <a:p>
+            <a:r>
+              <a:rPr lang="en-US" b="1" dirty="0">
+                <a:solidFill>
+                  <a:srgbClr val="FF0000"/>
+                </a:solidFill>
+              </a:rPr>
+              <a:t>NAU7802</a:t>
+            </a:r>
+            <a:r>
+              <a:rPr lang="en-US" dirty="0"/>
+              <a:t> – use </a:t>
+            </a:r>
+            <a:r>
+              <a:rPr lang="en-US" i="1" dirty="0"/>
+              <a:t>external</a:t>
+            </a:r>
+            <a:r>
+              <a:rPr lang="en-US" dirty="0"/>
+              <a:t> 3.3V LVR and 2.048V ref (or slightly more) for AN- and 2.048V + strain gauge voltage for AN+</a:t>
+            </a:r>
+          </a:p>
+        </p:txBody>
+      </p:sp>
+      <p:sp>
+        <p:nvSpPr>
+          <p:cNvPr id="5" name="TextBox 4">
+            <a:extLst>
+              <a:ext uri="{FF2B5EF4-FFF2-40B4-BE49-F238E27FC236}">
+                <a16:creationId xmlns:a16="http://schemas.microsoft.com/office/drawing/2014/main" id="{0799B6C1-493E-BBD0-67D5-5ED6A2DEEFBB}"/>
+              </a:ext>
+            </a:extLst>
+          </p:cNvPr>
+          <p:cNvSpPr txBox="1"/>
+          <p:nvPr/>
+        </p:nvSpPr>
+        <p:spPr>
+          <a:xfrm>
+            <a:off x="2241318" y="3277694"/>
+            <a:ext cx="7933459" cy="2261260"/>
           </a:xfrm>
           <a:prstGeom prst="rect">
             <a:avLst/>
           </a:prstGeom>
-        </p:spPr>
-      </p:pic>
-      <p:sp>
-        <p:nvSpPr>
-          <p:cNvPr id="10" name="TextBox 9">
-            <a:extLst>
-              <a:ext uri="{FF2B5EF4-FFF2-40B4-BE49-F238E27FC236}">
-                <a16:creationId xmlns:a16="http://schemas.microsoft.com/office/drawing/2014/main" id="{222041F2-67CC-5538-03EE-B6E2E3EAFF81}"/>
-              </a:ext>
-            </a:extLst>
-          </p:cNvPr>
-          <p:cNvSpPr txBox="1"/>
-          <p:nvPr/>
-        </p:nvSpPr>
-        <p:spPr>
-          <a:xfrm>
-            <a:off x="939102" y="234334"/>
-            <a:ext cx="3541888" cy="923330"/>
-          </a:xfrm>
-          <a:prstGeom prst="rect">
-            <a:avLst/>
-          </a:prstGeom>
           <a:noFill/>
         </p:spPr>
         <p:txBody>
-          <a:bodyPr wrap="square" rtlCol="0">
+          <a:bodyPr wrap="square">
             <a:spAutoFit/>
           </a:bodyPr>
           <a:lstStyle/>
           <a:p>
+            <a:pPr>
+              <a:lnSpc>
+                <a:spcPts val="1425"/>
+              </a:lnSpc>
+              <a:buNone/>
+            </a:pPr>
+            <a:r>
+              <a:rPr lang="en-US" b="0" dirty="0">
+                <a:solidFill>
+                  <a:srgbClr val="DAE3E3"/>
+                </a:solidFill>
+                <a:effectLst/>
+                <a:latin typeface="Consolas" panose="020B0609020204030204" pitchFamily="49" charset="0"/>
+              </a:rPr>
+              <a:t> </a:t>
+            </a:r>
+            <a:r>
+              <a:rPr lang="en-US" b="0" dirty="0" err="1">
+                <a:solidFill>
+                  <a:srgbClr val="F39C12"/>
+                </a:solidFill>
+                <a:effectLst/>
+                <a:latin typeface="Consolas" panose="020B0609020204030204" pitchFamily="49" charset="0"/>
+              </a:rPr>
+              <a:t>Serial</a:t>
+            </a:r>
+            <a:r>
+              <a:rPr lang="en-US" b="0" dirty="0" err="1">
+                <a:solidFill>
+                  <a:srgbClr val="DAE3E3"/>
+                </a:solidFill>
+                <a:effectLst/>
+                <a:latin typeface="Consolas" panose="020B0609020204030204" pitchFamily="49" charset="0"/>
+              </a:rPr>
+              <a:t>.</a:t>
+            </a:r>
+            <a:r>
+              <a:rPr lang="en-US" b="0" dirty="0" err="1">
+                <a:solidFill>
+                  <a:srgbClr val="F39C12"/>
+                </a:solidFill>
+                <a:effectLst/>
+                <a:latin typeface="Consolas" panose="020B0609020204030204" pitchFamily="49" charset="0"/>
+              </a:rPr>
+              <a:t>print</a:t>
+            </a:r>
+            <a:r>
+              <a:rPr lang="en-US" b="0" dirty="0">
+                <a:solidFill>
+                  <a:srgbClr val="DAE3E3"/>
+                </a:solidFill>
+                <a:effectLst/>
+                <a:latin typeface="Consolas" panose="020B0609020204030204" pitchFamily="49" charset="0"/>
+              </a:rPr>
+              <a:t>(</a:t>
+            </a:r>
+            <a:r>
+              <a:rPr lang="en-US" b="0" dirty="0">
+                <a:solidFill>
+                  <a:srgbClr val="7FCBCD"/>
+                </a:solidFill>
+                <a:effectLst/>
+                <a:latin typeface="Consolas" panose="020B0609020204030204" pitchFamily="49" charset="0"/>
+              </a:rPr>
+              <a:t>"LDO voltage set to "</a:t>
+            </a:r>
+            <a:r>
+              <a:rPr lang="en-US" b="0" dirty="0">
+                <a:solidFill>
+                  <a:srgbClr val="DAE3E3"/>
+                </a:solidFill>
+                <a:effectLst/>
+                <a:latin typeface="Consolas" panose="020B0609020204030204" pitchFamily="49" charset="0"/>
+              </a:rPr>
+              <a:t>);</a:t>
+            </a:r>
+          </a:p>
+          <a:p>
+            <a:pPr>
+              <a:lnSpc>
+                <a:spcPts val="1425"/>
+              </a:lnSpc>
+              <a:buNone/>
+            </a:pPr>
+            <a:r>
+              <a:rPr lang="en-US" b="0" dirty="0">
+                <a:solidFill>
+                  <a:srgbClr val="DAE3E3"/>
+                </a:solidFill>
+                <a:effectLst/>
+                <a:latin typeface="Consolas" panose="020B0609020204030204" pitchFamily="49" charset="0"/>
+              </a:rPr>
+              <a:t>  </a:t>
+            </a:r>
+            <a:r>
+              <a:rPr lang="en-US" b="0" dirty="0">
+                <a:solidFill>
+                  <a:srgbClr val="C586C0"/>
+                </a:solidFill>
+                <a:effectLst/>
+                <a:latin typeface="Consolas" panose="020B0609020204030204" pitchFamily="49" charset="0"/>
+              </a:rPr>
+              <a:t>switch</a:t>
+            </a:r>
+            <a:r>
+              <a:rPr lang="en-US" b="0" dirty="0">
+                <a:solidFill>
+                  <a:srgbClr val="DAE3E3"/>
+                </a:solidFill>
+                <a:effectLst/>
+                <a:latin typeface="Consolas" panose="020B0609020204030204" pitchFamily="49" charset="0"/>
+              </a:rPr>
+              <a:t> (</a:t>
+            </a:r>
+            <a:r>
+              <a:rPr lang="en-US" b="0" dirty="0" err="1">
+                <a:solidFill>
+                  <a:srgbClr val="F39C12"/>
+                </a:solidFill>
+                <a:effectLst/>
+                <a:latin typeface="Consolas" panose="020B0609020204030204" pitchFamily="49" charset="0"/>
+              </a:rPr>
+              <a:t>nau</a:t>
+            </a:r>
+            <a:r>
+              <a:rPr lang="en-US" b="0" dirty="0" err="1">
+                <a:solidFill>
+                  <a:srgbClr val="DAE3E3"/>
+                </a:solidFill>
+                <a:effectLst/>
+                <a:latin typeface="Consolas" panose="020B0609020204030204" pitchFamily="49" charset="0"/>
+              </a:rPr>
+              <a:t>.</a:t>
+            </a:r>
+            <a:r>
+              <a:rPr lang="en-US" b="0" dirty="0" err="1">
+                <a:solidFill>
+                  <a:srgbClr val="F39C12"/>
+                </a:solidFill>
+                <a:effectLst/>
+                <a:latin typeface="Consolas" panose="020B0609020204030204" pitchFamily="49" charset="0"/>
+              </a:rPr>
+              <a:t>getLDO</a:t>
+            </a:r>
+            <a:r>
+              <a:rPr lang="en-US" b="0" dirty="0">
+                <a:solidFill>
+                  <a:srgbClr val="DAE3E3"/>
+                </a:solidFill>
+                <a:effectLst/>
+                <a:latin typeface="Consolas" panose="020B0609020204030204" pitchFamily="49" charset="0"/>
+              </a:rPr>
+              <a:t>()) {</a:t>
+            </a:r>
+          </a:p>
+          <a:p>
+            <a:pPr>
+              <a:lnSpc>
+                <a:spcPts val="1425"/>
+              </a:lnSpc>
+              <a:buNone/>
+            </a:pPr>
+            <a:r>
+              <a:rPr lang="en-US" b="0" dirty="0">
+                <a:solidFill>
+                  <a:srgbClr val="DAE3E3"/>
+                </a:solidFill>
+                <a:effectLst/>
+                <a:latin typeface="Consolas" panose="020B0609020204030204" pitchFamily="49" charset="0"/>
+              </a:rPr>
+              <a:t>    </a:t>
+            </a:r>
+            <a:r>
+              <a:rPr lang="en-US" b="0" dirty="0">
+                <a:solidFill>
+                  <a:srgbClr val="C586C0"/>
+                </a:solidFill>
+                <a:effectLst/>
+                <a:latin typeface="Consolas" panose="020B0609020204030204" pitchFamily="49" charset="0"/>
+              </a:rPr>
+              <a:t>case</a:t>
+            </a:r>
+            <a:r>
+              <a:rPr lang="en-US" b="0" dirty="0">
+                <a:solidFill>
+                  <a:srgbClr val="DAE3E3"/>
+                </a:solidFill>
+                <a:effectLst/>
+                <a:latin typeface="Consolas" panose="020B0609020204030204" pitchFamily="49" charset="0"/>
+              </a:rPr>
+              <a:t> NAU7802_4V5:  </a:t>
+            </a:r>
+            <a:r>
+              <a:rPr lang="en-US" b="0" dirty="0" err="1">
+                <a:solidFill>
+                  <a:srgbClr val="F39C12"/>
+                </a:solidFill>
+                <a:effectLst/>
+                <a:latin typeface="Consolas" panose="020B0609020204030204" pitchFamily="49" charset="0"/>
+              </a:rPr>
+              <a:t>Serial</a:t>
+            </a:r>
+            <a:r>
+              <a:rPr lang="en-US" b="0" dirty="0" err="1">
+                <a:solidFill>
+                  <a:srgbClr val="DAE3E3"/>
+                </a:solidFill>
+                <a:effectLst/>
+                <a:latin typeface="Consolas" panose="020B0609020204030204" pitchFamily="49" charset="0"/>
+              </a:rPr>
+              <a:t>.</a:t>
+            </a:r>
+            <a:r>
+              <a:rPr lang="en-US" b="0" dirty="0" err="1">
+                <a:solidFill>
+                  <a:srgbClr val="F39C12"/>
+                </a:solidFill>
+                <a:effectLst/>
+                <a:latin typeface="Consolas" panose="020B0609020204030204" pitchFamily="49" charset="0"/>
+              </a:rPr>
+              <a:t>println</a:t>
+            </a:r>
+            <a:r>
+              <a:rPr lang="en-US" b="0" dirty="0">
+                <a:solidFill>
+                  <a:srgbClr val="DAE3E3"/>
+                </a:solidFill>
+                <a:effectLst/>
+                <a:latin typeface="Consolas" panose="020B0609020204030204" pitchFamily="49" charset="0"/>
+              </a:rPr>
+              <a:t>(</a:t>
+            </a:r>
+            <a:r>
+              <a:rPr lang="en-US" b="0" dirty="0">
+                <a:solidFill>
+                  <a:srgbClr val="7FCBCD"/>
+                </a:solidFill>
+                <a:effectLst/>
+                <a:latin typeface="Consolas" panose="020B0609020204030204" pitchFamily="49" charset="0"/>
+              </a:rPr>
+              <a:t>"4.5V"</a:t>
+            </a:r>
+            <a:r>
+              <a:rPr lang="en-US" b="0" dirty="0">
+                <a:solidFill>
+                  <a:srgbClr val="DAE3E3"/>
+                </a:solidFill>
+                <a:effectLst/>
+                <a:latin typeface="Consolas" panose="020B0609020204030204" pitchFamily="49" charset="0"/>
+              </a:rPr>
+              <a:t>); </a:t>
+            </a:r>
+            <a:r>
+              <a:rPr lang="en-US" b="0" dirty="0">
+                <a:solidFill>
+                  <a:srgbClr val="C586C0"/>
+                </a:solidFill>
+                <a:effectLst/>
+                <a:latin typeface="Consolas" panose="020B0609020204030204" pitchFamily="49" charset="0"/>
+              </a:rPr>
+              <a:t>break</a:t>
+            </a:r>
+            <a:r>
+              <a:rPr lang="en-US" b="0" dirty="0">
+                <a:solidFill>
+                  <a:srgbClr val="DAE3E3"/>
+                </a:solidFill>
+                <a:effectLst/>
+                <a:latin typeface="Consolas" panose="020B0609020204030204" pitchFamily="49" charset="0"/>
+              </a:rPr>
+              <a:t>;</a:t>
+            </a:r>
+          </a:p>
+          <a:p>
+            <a:pPr>
+              <a:lnSpc>
+                <a:spcPts val="1425"/>
+              </a:lnSpc>
+              <a:buNone/>
+            </a:pPr>
+            <a:r>
+              <a:rPr lang="en-US" b="0" dirty="0">
+                <a:solidFill>
+                  <a:srgbClr val="DAE3E3"/>
+                </a:solidFill>
+                <a:effectLst/>
+                <a:latin typeface="Consolas" panose="020B0609020204030204" pitchFamily="49" charset="0"/>
+              </a:rPr>
+              <a:t>    </a:t>
+            </a:r>
+            <a:r>
+              <a:rPr lang="en-US" b="0" dirty="0">
+                <a:solidFill>
+                  <a:srgbClr val="C586C0"/>
+                </a:solidFill>
+                <a:effectLst/>
+                <a:latin typeface="Consolas" panose="020B0609020204030204" pitchFamily="49" charset="0"/>
+              </a:rPr>
+              <a:t>case</a:t>
+            </a:r>
+            <a:r>
+              <a:rPr lang="en-US" b="0" dirty="0">
+                <a:solidFill>
+                  <a:srgbClr val="DAE3E3"/>
+                </a:solidFill>
+                <a:effectLst/>
+                <a:latin typeface="Consolas" panose="020B0609020204030204" pitchFamily="49" charset="0"/>
+              </a:rPr>
+              <a:t> NAU7802_4V2:  </a:t>
+            </a:r>
+            <a:r>
+              <a:rPr lang="en-US" b="0" dirty="0" err="1">
+                <a:solidFill>
+                  <a:srgbClr val="F39C12"/>
+                </a:solidFill>
+                <a:effectLst/>
+                <a:latin typeface="Consolas" panose="020B0609020204030204" pitchFamily="49" charset="0"/>
+              </a:rPr>
+              <a:t>Serial</a:t>
+            </a:r>
+            <a:r>
+              <a:rPr lang="en-US" b="0" dirty="0" err="1">
+                <a:solidFill>
+                  <a:srgbClr val="DAE3E3"/>
+                </a:solidFill>
+                <a:effectLst/>
+                <a:latin typeface="Consolas" panose="020B0609020204030204" pitchFamily="49" charset="0"/>
+              </a:rPr>
+              <a:t>.</a:t>
+            </a:r>
+            <a:r>
+              <a:rPr lang="en-US" b="0" dirty="0" err="1">
+                <a:solidFill>
+                  <a:srgbClr val="F39C12"/>
+                </a:solidFill>
+                <a:effectLst/>
+                <a:latin typeface="Consolas" panose="020B0609020204030204" pitchFamily="49" charset="0"/>
+              </a:rPr>
+              <a:t>println</a:t>
+            </a:r>
+            <a:r>
+              <a:rPr lang="en-US" b="0" dirty="0">
+                <a:solidFill>
+                  <a:srgbClr val="DAE3E3"/>
+                </a:solidFill>
+                <a:effectLst/>
+                <a:latin typeface="Consolas" panose="020B0609020204030204" pitchFamily="49" charset="0"/>
+              </a:rPr>
+              <a:t>(</a:t>
+            </a:r>
+            <a:r>
+              <a:rPr lang="en-US" b="0" dirty="0">
+                <a:solidFill>
+                  <a:srgbClr val="7FCBCD"/>
+                </a:solidFill>
+                <a:effectLst/>
+                <a:latin typeface="Consolas" panose="020B0609020204030204" pitchFamily="49" charset="0"/>
+              </a:rPr>
+              <a:t>"4.2V"</a:t>
+            </a:r>
+            <a:r>
+              <a:rPr lang="en-US" b="0" dirty="0">
+                <a:solidFill>
+                  <a:srgbClr val="DAE3E3"/>
+                </a:solidFill>
+                <a:effectLst/>
+                <a:latin typeface="Consolas" panose="020B0609020204030204" pitchFamily="49" charset="0"/>
+              </a:rPr>
+              <a:t>); </a:t>
+            </a:r>
+            <a:r>
+              <a:rPr lang="en-US" b="0" dirty="0">
+                <a:solidFill>
+                  <a:srgbClr val="C586C0"/>
+                </a:solidFill>
+                <a:effectLst/>
+                <a:latin typeface="Consolas" panose="020B0609020204030204" pitchFamily="49" charset="0"/>
+              </a:rPr>
+              <a:t>break</a:t>
+            </a:r>
+            <a:r>
+              <a:rPr lang="en-US" b="0" dirty="0">
+                <a:solidFill>
+                  <a:srgbClr val="DAE3E3"/>
+                </a:solidFill>
+                <a:effectLst/>
+                <a:latin typeface="Consolas" panose="020B0609020204030204" pitchFamily="49" charset="0"/>
+              </a:rPr>
+              <a:t>;</a:t>
+            </a:r>
+          </a:p>
+          <a:p>
+            <a:pPr>
+              <a:lnSpc>
+                <a:spcPts val="1425"/>
+              </a:lnSpc>
+              <a:buNone/>
+            </a:pPr>
+            <a:r>
+              <a:rPr lang="en-US" b="0" dirty="0">
+                <a:solidFill>
+                  <a:srgbClr val="DAE3E3"/>
+                </a:solidFill>
+                <a:effectLst/>
+                <a:latin typeface="Consolas" panose="020B0609020204030204" pitchFamily="49" charset="0"/>
+              </a:rPr>
+              <a:t>    </a:t>
+            </a:r>
+            <a:r>
+              <a:rPr lang="en-US" b="0" dirty="0">
+                <a:solidFill>
+                  <a:srgbClr val="C586C0"/>
+                </a:solidFill>
+                <a:effectLst/>
+                <a:latin typeface="Consolas" panose="020B0609020204030204" pitchFamily="49" charset="0"/>
+              </a:rPr>
+              <a:t>case</a:t>
+            </a:r>
+            <a:r>
+              <a:rPr lang="en-US" b="0" dirty="0">
+                <a:solidFill>
+                  <a:srgbClr val="DAE3E3"/>
+                </a:solidFill>
+                <a:effectLst/>
+                <a:latin typeface="Consolas" panose="020B0609020204030204" pitchFamily="49" charset="0"/>
+              </a:rPr>
+              <a:t> NAU7802_3V9:  </a:t>
+            </a:r>
+            <a:r>
+              <a:rPr lang="en-US" b="0" dirty="0" err="1">
+                <a:solidFill>
+                  <a:srgbClr val="F39C12"/>
+                </a:solidFill>
+                <a:effectLst/>
+                <a:latin typeface="Consolas" panose="020B0609020204030204" pitchFamily="49" charset="0"/>
+              </a:rPr>
+              <a:t>Serial</a:t>
+            </a:r>
+            <a:r>
+              <a:rPr lang="en-US" b="0" dirty="0" err="1">
+                <a:solidFill>
+                  <a:srgbClr val="DAE3E3"/>
+                </a:solidFill>
+                <a:effectLst/>
+                <a:latin typeface="Consolas" panose="020B0609020204030204" pitchFamily="49" charset="0"/>
+              </a:rPr>
+              <a:t>.</a:t>
+            </a:r>
+            <a:r>
+              <a:rPr lang="en-US" b="0" dirty="0" err="1">
+                <a:solidFill>
+                  <a:srgbClr val="F39C12"/>
+                </a:solidFill>
+                <a:effectLst/>
+                <a:latin typeface="Consolas" panose="020B0609020204030204" pitchFamily="49" charset="0"/>
+              </a:rPr>
+              <a:t>println</a:t>
+            </a:r>
+            <a:r>
+              <a:rPr lang="en-US" b="0" dirty="0">
+                <a:solidFill>
+                  <a:srgbClr val="DAE3E3"/>
+                </a:solidFill>
+                <a:effectLst/>
+                <a:latin typeface="Consolas" panose="020B0609020204030204" pitchFamily="49" charset="0"/>
+              </a:rPr>
+              <a:t>(</a:t>
+            </a:r>
+            <a:r>
+              <a:rPr lang="en-US" b="0" dirty="0">
+                <a:solidFill>
+                  <a:srgbClr val="7FCBCD"/>
+                </a:solidFill>
+                <a:effectLst/>
+                <a:latin typeface="Consolas" panose="020B0609020204030204" pitchFamily="49" charset="0"/>
+              </a:rPr>
+              <a:t>"3.9V"</a:t>
+            </a:r>
+            <a:r>
+              <a:rPr lang="en-US" b="0" dirty="0">
+                <a:solidFill>
+                  <a:srgbClr val="DAE3E3"/>
+                </a:solidFill>
+                <a:effectLst/>
+                <a:latin typeface="Consolas" panose="020B0609020204030204" pitchFamily="49" charset="0"/>
+              </a:rPr>
+              <a:t>); </a:t>
+            </a:r>
+            <a:r>
+              <a:rPr lang="en-US" b="0" dirty="0">
+                <a:solidFill>
+                  <a:srgbClr val="C586C0"/>
+                </a:solidFill>
+                <a:effectLst/>
+                <a:latin typeface="Consolas" panose="020B0609020204030204" pitchFamily="49" charset="0"/>
+              </a:rPr>
+              <a:t>break</a:t>
+            </a:r>
+            <a:r>
+              <a:rPr lang="en-US" b="0" dirty="0">
+                <a:solidFill>
+                  <a:srgbClr val="DAE3E3"/>
+                </a:solidFill>
+                <a:effectLst/>
+                <a:latin typeface="Consolas" panose="020B0609020204030204" pitchFamily="49" charset="0"/>
+              </a:rPr>
+              <a:t>;</a:t>
+            </a:r>
+          </a:p>
+          <a:p>
+            <a:pPr>
+              <a:lnSpc>
+                <a:spcPts val="1425"/>
+              </a:lnSpc>
+              <a:buNone/>
+            </a:pPr>
+            <a:r>
+              <a:rPr lang="en-US" b="0" dirty="0">
+                <a:solidFill>
+                  <a:srgbClr val="DAE3E3"/>
+                </a:solidFill>
+                <a:effectLst/>
+                <a:latin typeface="Consolas" panose="020B0609020204030204" pitchFamily="49" charset="0"/>
+              </a:rPr>
+              <a:t>    </a:t>
+            </a:r>
+            <a:r>
+              <a:rPr lang="en-US" b="0" dirty="0">
+                <a:solidFill>
+                  <a:srgbClr val="C586C0"/>
+                </a:solidFill>
+                <a:effectLst/>
+                <a:latin typeface="Consolas" panose="020B0609020204030204" pitchFamily="49" charset="0"/>
+              </a:rPr>
+              <a:t>case</a:t>
+            </a:r>
+            <a:r>
+              <a:rPr lang="en-US" b="0" dirty="0">
+                <a:solidFill>
+                  <a:srgbClr val="DAE3E3"/>
+                </a:solidFill>
+                <a:effectLst/>
+                <a:latin typeface="Consolas" panose="020B0609020204030204" pitchFamily="49" charset="0"/>
+              </a:rPr>
+              <a:t> NAU7802_3V6:  </a:t>
+            </a:r>
+            <a:r>
+              <a:rPr lang="en-US" b="0" dirty="0" err="1">
+                <a:solidFill>
+                  <a:srgbClr val="F39C12"/>
+                </a:solidFill>
+                <a:effectLst/>
+                <a:latin typeface="Consolas" panose="020B0609020204030204" pitchFamily="49" charset="0"/>
+              </a:rPr>
+              <a:t>Serial</a:t>
+            </a:r>
+            <a:r>
+              <a:rPr lang="en-US" b="0" dirty="0" err="1">
+                <a:solidFill>
+                  <a:srgbClr val="DAE3E3"/>
+                </a:solidFill>
+                <a:effectLst/>
+                <a:latin typeface="Consolas" panose="020B0609020204030204" pitchFamily="49" charset="0"/>
+              </a:rPr>
+              <a:t>.</a:t>
+            </a:r>
+            <a:r>
+              <a:rPr lang="en-US" b="0" dirty="0" err="1">
+                <a:solidFill>
+                  <a:srgbClr val="F39C12"/>
+                </a:solidFill>
+                <a:effectLst/>
+                <a:latin typeface="Consolas" panose="020B0609020204030204" pitchFamily="49" charset="0"/>
+              </a:rPr>
+              <a:t>println</a:t>
+            </a:r>
+            <a:r>
+              <a:rPr lang="en-US" b="0" dirty="0">
+                <a:solidFill>
+                  <a:srgbClr val="DAE3E3"/>
+                </a:solidFill>
+                <a:effectLst/>
+                <a:latin typeface="Consolas" panose="020B0609020204030204" pitchFamily="49" charset="0"/>
+              </a:rPr>
+              <a:t>(</a:t>
+            </a:r>
+            <a:r>
+              <a:rPr lang="en-US" b="0" dirty="0">
+                <a:solidFill>
+                  <a:srgbClr val="7FCBCD"/>
+                </a:solidFill>
+                <a:effectLst/>
+                <a:latin typeface="Consolas" panose="020B0609020204030204" pitchFamily="49" charset="0"/>
+              </a:rPr>
+              <a:t>"3.6V"</a:t>
+            </a:r>
+            <a:r>
+              <a:rPr lang="en-US" b="0" dirty="0">
+                <a:solidFill>
+                  <a:srgbClr val="DAE3E3"/>
+                </a:solidFill>
+                <a:effectLst/>
+                <a:latin typeface="Consolas" panose="020B0609020204030204" pitchFamily="49" charset="0"/>
+              </a:rPr>
+              <a:t>); </a:t>
+            </a:r>
+            <a:r>
+              <a:rPr lang="en-US" b="0" dirty="0">
+                <a:solidFill>
+                  <a:srgbClr val="C586C0"/>
+                </a:solidFill>
+                <a:effectLst/>
+                <a:latin typeface="Consolas" panose="020B0609020204030204" pitchFamily="49" charset="0"/>
+              </a:rPr>
+              <a:t>break</a:t>
+            </a:r>
+            <a:r>
+              <a:rPr lang="en-US" b="0" dirty="0">
+                <a:solidFill>
+                  <a:srgbClr val="DAE3E3"/>
+                </a:solidFill>
+                <a:effectLst/>
+                <a:latin typeface="Consolas" panose="020B0609020204030204" pitchFamily="49" charset="0"/>
+              </a:rPr>
+              <a:t>;</a:t>
+            </a:r>
+          </a:p>
+          <a:p>
+            <a:pPr>
+              <a:lnSpc>
+                <a:spcPts val="1425"/>
+              </a:lnSpc>
+              <a:buNone/>
+            </a:pPr>
+            <a:r>
+              <a:rPr lang="en-US" b="0" dirty="0">
+                <a:solidFill>
+                  <a:srgbClr val="DAE3E3"/>
+                </a:solidFill>
+                <a:effectLst/>
+                <a:latin typeface="Consolas" panose="020B0609020204030204" pitchFamily="49" charset="0"/>
+              </a:rPr>
+              <a:t>    </a:t>
+            </a:r>
+            <a:r>
+              <a:rPr lang="en-US" b="0" dirty="0">
+                <a:solidFill>
+                  <a:srgbClr val="C586C0"/>
+                </a:solidFill>
+                <a:effectLst/>
+                <a:latin typeface="Consolas" panose="020B0609020204030204" pitchFamily="49" charset="0"/>
+              </a:rPr>
+              <a:t>case</a:t>
+            </a:r>
+            <a:r>
+              <a:rPr lang="en-US" b="0" dirty="0">
+                <a:solidFill>
+                  <a:srgbClr val="DAE3E3"/>
+                </a:solidFill>
+                <a:effectLst/>
+                <a:latin typeface="Consolas" panose="020B0609020204030204" pitchFamily="49" charset="0"/>
+              </a:rPr>
+              <a:t> NAU7802_3V3:  </a:t>
+            </a:r>
+            <a:r>
+              <a:rPr lang="en-US" b="0" dirty="0" err="1">
+                <a:solidFill>
+                  <a:srgbClr val="F39C12"/>
+                </a:solidFill>
+                <a:effectLst/>
+                <a:latin typeface="Consolas" panose="020B0609020204030204" pitchFamily="49" charset="0"/>
+              </a:rPr>
+              <a:t>Serial</a:t>
+            </a:r>
+            <a:r>
+              <a:rPr lang="en-US" b="0" dirty="0" err="1">
+                <a:solidFill>
+                  <a:srgbClr val="DAE3E3"/>
+                </a:solidFill>
+                <a:effectLst/>
+                <a:latin typeface="Consolas" panose="020B0609020204030204" pitchFamily="49" charset="0"/>
+              </a:rPr>
+              <a:t>.</a:t>
+            </a:r>
+            <a:r>
+              <a:rPr lang="en-US" b="0" dirty="0" err="1">
+                <a:solidFill>
+                  <a:srgbClr val="F39C12"/>
+                </a:solidFill>
+                <a:effectLst/>
+                <a:latin typeface="Consolas" panose="020B0609020204030204" pitchFamily="49" charset="0"/>
+              </a:rPr>
+              <a:t>println</a:t>
+            </a:r>
+            <a:r>
+              <a:rPr lang="en-US" b="0" dirty="0">
+                <a:solidFill>
+                  <a:srgbClr val="DAE3E3"/>
+                </a:solidFill>
+                <a:effectLst/>
+                <a:latin typeface="Consolas" panose="020B0609020204030204" pitchFamily="49" charset="0"/>
+              </a:rPr>
+              <a:t>(</a:t>
+            </a:r>
+            <a:r>
+              <a:rPr lang="en-US" b="0" dirty="0">
+                <a:solidFill>
+                  <a:srgbClr val="7FCBCD"/>
+                </a:solidFill>
+                <a:effectLst/>
+                <a:latin typeface="Consolas" panose="020B0609020204030204" pitchFamily="49" charset="0"/>
+              </a:rPr>
+              <a:t>"3.3V"</a:t>
+            </a:r>
+            <a:r>
+              <a:rPr lang="en-US" b="0" dirty="0">
+                <a:solidFill>
+                  <a:srgbClr val="DAE3E3"/>
+                </a:solidFill>
+                <a:effectLst/>
+                <a:latin typeface="Consolas" panose="020B0609020204030204" pitchFamily="49" charset="0"/>
+              </a:rPr>
+              <a:t>); </a:t>
+            </a:r>
+            <a:r>
+              <a:rPr lang="en-US" b="0" dirty="0">
+                <a:solidFill>
+                  <a:srgbClr val="C586C0"/>
+                </a:solidFill>
+                <a:effectLst/>
+                <a:latin typeface="Consolas" panose="020B0609020204030204" pitchFamily="49" charset="0"/>
+              </a:rPr>
+              <a:t>break</a:t>
+            </a:r>
+            <a:r>
+              <a:rPr lang="en-US" b="0" dirty="0">
+                <a:solidFill>
+                  <a:srgbClr val="DAE3E3"/>
+                </a:solidFill>
+                <a:effectLst/>
+                <a:latin typeface="Consolas" panose="020B0609020204030204" pitchFamily="49" charset="0"/>
+              </a:rPr>
+              <a:t>;</a:t>
+            </a:r>
+          </a:p>
+          <a:p>
+            <a:pPr>
+              <a:lnSpc>
+                <a:spcPts val="1425"/>
+              </a:lnSpc>
+              <a:buNone/>
+            </a:pPr>
+            <a:r>
+              <a:rPr lang="en-US" b="0" dirty="0">
+                <a:solidFill>
+                  <a:srgbClr val="DAE3E3"/>
+                </a:solidFill>
+                <a:effectLst/>
+                <a:latin typeface="Consolas" panose="020B0609020204030204" pitchFamily="49" charset="0"/>
+              </a:rPr>
+              <a:t>    </a:t>
+            </a:r>
+            <a:r>
+              <a:rPr lang="en-US" b="0" dirty="0">
+                <a:solidFill>
+                  <a:srgbClr val="C586C0"/>
+                </a:solidFill>
+                <a:effectLst/>
+                <a:latin typeface="Consolas" panose="020B0609020204030204" pitchFamily="49" charset="0"/>
+              </a:rPr>
+              <a:t>case</a:t>
+            </a:r>
+            <a:r>
+              <a:rPr lang="en-US" b="0" dirty="0">
+                <a:solidFill>
+                  <a:srgbClr val="DAE3E3"/>
+                </a:solidFill>
+                <a:effectLst/>
+                <a:latin typeface="Consolas" panose="020B0609020204030204" pitchFamily="49" charset="0"/>
+              </a:rPr>
+              <a:t> NAU7802_3V0:  </a:t>
+            </a:r>
+            <a:r>
+              <a:rPr lang="en-US" b="0" dirty="0" err="1">
+                <a:solidFill>
+                  <a:srgbClr val="F39C12"/>
+                </a:solidFill>
+                <a:effectLst/>
+                <a:latin typeface="Consolas" panose="020B0609020204030204" pitchFamily="49" charset="0"/>
+              </a:rPr>
+              <a:t>Serial</a:t>
+            </a:r>
+            <a:r>
+              <a:rPr lang="en-US" b="0" dirty="0" err="1">
+                <a:solidFill>
+                  <a:srgbClr val="DAE3E3"/>
+                </a:solidFill>
+                <a:effectLst/>
+                <a:latin typeface="Consolas" panose="020B0609020204030204" pitchFamily="49" charset="0"/>
+              </a:rPr>
+              <a:t>.</a:t>
+            </a:r>
+            <a:r>
+              <a:rPr lang="en-US" b="0" dirty="0" err="1">
+                <a:solidFill>
+                  <a:srgbClr val="F39C12"/>
+                </a:solidFill>
+                <a:effectLst/>
+                <a:latin typeface="Consolas" panose="020B0609020204030204" pitchFamily="49" charset="0"/>
+              </a:rPr>
+              <a:t>println</a:t>
+            </a:r>
+            <a:r>
+              <a:rPr lang="en-US" b="0" dirty="0">
+                <a:solidFill>
+                  <a:srgbClr val="DAE3E3"/>
+                </a:solidFill>
+                <a:effectLst/>
+                <a:latin typeface="Consolas" panose="020B0609020204030204" pitchFamily="49" charset="0"/>
+              </a:rPr>
+              <a:t>(</a:t>
+            </a:r>
+            <a:r>
+              <a:rPr lang="en-US" b="0" dirty="0">
+                <a:solidFill>
+                  <a:srgbClr val="7FCBCD"/>
+                </a:solidFill>
+                <a:effectLst/>
+                <a:latin typeface="Consolas" panose="020B0609020204030204" pitchFamily="49" charset="0"/>
+              </a:rPr>
+              <a:t>"3.0V"</a:t>
+            </a:r>
+            <a:r>
+              <a:rPr lang="en-US" b="0" dirty="0">
+                <a:solidFill>
+                  <a:srgbClr val="DAE3E3"/>
+                </a:solidFill>
+                <a:effectLst/>
+                <a:latin typeface="Consolas" panose="020B0609020204030204" pitchFamily="49" charset="0"/>
+              </a:rPr>
+              <a:t>); </a:t>
+            </a:r>
+            <a:r>
+              <a:rPr lang="en-US" b="0" dirty="0">
+                <a:solidFill>
+                  <a:srgbClr val="C586C0"/>
+                </a:solidFill>
+                <a:effectLst/>
+                <a:latin typeface="Consolas" panose="020B0609020204030204" pitchFamily="49" charset="0"/>
+              </a:rPr>
+              <a:t>break</a:t>
+            </a:r>
+            <a:r>
+              <a:rPr lang="en-US" b="0" dirty="0">
+                <a:solidFill>
+                  <a:srgbClr val="DAE3E3"/>
+                </a:solidFill>
+                <a:effectLst/>
+                <a:latin typeface="Consolas" panose="020B0609020204030204" pitchFamily="49" charset="0"/>
+              </a:rPr>
+              <a:t>;</a:t>
+            </a:r>
+          </a:p>
+          <a:p>
+            <a:pPr>
+              <a:lnSpc>
+                <a:spcPts val="1425"/>
+              </a:lnSpc>
+              <a:buNone/>
+            </a:pPr>
+            <a:r>
+              <a:rPr lang="en-US" b="0" dirty="0">
+                <a:solidFill>
+                  <a:srgbClr val="DAE3E3"/>
+                </a:solidFill>
+                <a:effectLst/>
+                <a:latin typeface="Consolas" panose="020B0609020204030204" pitchFamily="49" charset="0"/>
+              </a:rPr>
+              <a:t>    </a:t>
+            </a:r>
+            <a:r>
+              <a:rPr lang="en-US" b="0" dirty="0">
+                <a:solidFill>
+                  <a:srgbClr val="C586C0"/>
+                </a:solidFill>
+                <a:effectLst/>
+                <a:latin typeface="Consolas" panose="020B0609020204030204" pitchFamily="49" charset="0"/>
+              </a:rPr>
+              <a:t>case</a:t>
+            </a:r>
+            <a:r>
+              <a:rPr lang="en-US" b="0" dirty="0">
+                <a:solidFill>
+                  <a:srgbClr val="DAE3E3"/>
+                </a:solidFill>
+                <a:effectLst/>
+                <a:latin typeface="Consolas" panose="020B0609020204030204" pitchFamily="49" charset="0"/>
+              </a:rPr>
+              <a:t> NAU7802_2V7:  </a:t>
+            </a:r>
+            <a:r>
+              <a:rPr lang="en-US" b="0" dirty="0" err="1">
+                <a:solidFill>
+                  <a:srgbClr val="F39C12"/>
+                </a:solidFill>
+                <a:effectLst/>
+                <a:latin typeface="Consolas" panose="020B0609020204030204" pitchFamily="49" charset="0"/>
+              </a:rPr>
+              <a:t>Serial</a:t>
+            </a:r>
+            <a:r>
+              <a:rPr lang="en-US" b="0" dirty="0" err="1">
+                <a:solidFill>
+                  <a:srgbClr val="DAE3E3"/>
+                </a:solidFill>
+                <a:effectLst/>
+                <a:latin typeface="Consolas" panose="020B0609020204030204" pitchFamily="49" charset="0"/>
+              </a:rPr>
+              <a:t>.</a:t>
+            </a:r>
+            <a:r>
+              <a:rPr lang="en-US" b="0" dirty="0" err="1">
+                <a:solidFill>
+                  <a:srgbClr val="F39C12"/>
+                </a:solidFill>
+                <a:effectLst/>
+                <a:latin typeface="Consolas" panose="020B0609020204030204" pitchFamily="49" charset="0"/>
+              </a:rPr>
+              <a:t>println</a:t>
+            </a:r>
+            <a:r>
+              <a:rPr lang="en-US" b="0" dirty="0">
+                <a:solidFill>
+                  <a:srgbClr val="DAE3E3"/>
+                </a:solidFill>
+                <a:effectLst/>
+                <a:latin typeface="Consolas" panose="020B0609020204030204" pitchFamily="49" charset="0"/>
+              </a:rPr>
+              <a:t>(</a:t>
+            </a:r>
+            <a:r>
+              <a:rPr lang="en-US" b="0" dirty="0">
+                <a:solidFill>
+                  <a:srgbClr val="7FCBCD"/>
+                </a:solidFill>
+                <a:effectLst/>
+                <a:latin typeface="Consolas" panose="020B0609020204030204" pitchFamily="49" charset="0"/>
+              </a:rPr>
+              <a:t>"2.7V"</a:t>
+            </a:r>
+            <a:r>
+              <a:rPr lang="en-US" b="0" dirty="0">
+                <a:solidFill>
+                  <a:srgbClr val="DAE3E3"/>
+                </a:solidFill>
+                <a:effectLst/>
+                <a:latin typeface="Consolas" panose="020B0609020204030204" pitchFamily="49" charset="0"/>
+              </a:rPr>
+              <a:t>); </a:t>
+            </a:r>
+            <a:r>
+              <a:rPr lang="en-US" b="0" dirty="0">
+                <a:solidFill>
+                  <a:srgbClr val="C586C0"/>
+                </a:solidFill>
+                <a:effectLst/>
+                <a:latin typeface="Consolas" panose="020B0609020204030204" pitchFamily="49" charset="0"/>
+              </a:rPr>
+              <a:t>break</a:t>
+            </a:r>
+            <a:r>
+              <a:rPr lang="en-US" b="0" dirty="0">
+                <a:solidFill>
+                  <a:srgbClr val="DAE3E3"/>
+                </a:solidFill>
+                <a:effectLst/>
+                <a:latin typeface="Consolas" panose="020B0609020204030204" pitchFamily="49" charset="0"/>
+              </a:rPr>
+              <a:t>;</a:t>
+            </a:r>
+          </a:p>
+          <a:p>
+            <a:pPr>
+              <a:lnSpc>
+                <a:spcPts val="1425"/>
+              </a:lnSpc>
+              <a:buNone/>
+            </a:pPr>
+            <a:r>
+              <a:rPr lang="en-US" b="0" dirty="0">
+                <a:solidFill>
+                  <a:srgbClr val="DAE3E3"/>
+                </a:solidFill>
+                <a:effectLst/>
+                <a:latin typeface="Consolas" panose="020B0609020204030204" pitchFamily="49" charset="0"/>
+              </a:rPr>
+              <a:t>    </a:t>
+            </a:r>
+            <a:r>
+              <a:rPr lang="en-US" b="0" dirty="0">
+                <a:solidFill>
+                  <a:srgbClr val="C586C0"/>
+                </a:solidFill>
+                <a:effectLst/>
+                <a:latin typeface="Consolas" panose="020B0609020204030204" pitchFamily="49" charset="0"/>
+              </a:rPr>
+              <a:t>case</a:t>
+            </a:r>
+            <a:r>
+              <a:rPr lang="en-US" b="0" dirty="0">
+                <a:solidFill>
+                  <a:srgbClr val="DAE3E3"/>
+                </a:solidFill>
+                <a:effectLst/>
+                <a:latin typeface="Consolas" panose="020B0609020204030204" pitchFamily="49" charset="0"/>
+              </a:rPr>
+              <a:t> NAU7802_2V4:  </a:t>
+            </a:r>
+            <a:r>
+              <a:rPr lang="en-US" b="0" dirty="0" err="1">
+                <a:solidFill>
+                  <a:srgbClr val="F39C12"/>
+                </a:solidFill>
+                <a:effectLst/>
+                <a:latin typeface="Consolas" panose="020B0609020204030204" pitchFamily="49" charset="0"/>
+              </a:rPr>
+              <a:t>Serial</a:t>
+            </a:r>
+            <a:r>
+              <a:rPr lang="en-US" b="0" dirty="0" err="1">
+                <a:solidFill>
+                  <a:srgbClr val="DAE3E3"/>
+                </a:solidFill>
+                <a:effectLst/>
+                <a:latin typeface="Consolas" panose="020B0609020204030204" pitchFamily="49" charset="0"/>
+              </a:rPr>
+              <a:t>.</a:t>
+            </a:r>
+            <a:r>
+              <a:rPr lang="en-US" b="0" dirty="0" err="1">
+                <a:solidFill>
+                  <a:srgbClr val="F39C12"/>
+                </a:solidFill>
+                <a:effectLst/>
+                <a:latin typeface="Consolas" panose="020B0609020204030204" pitchFamily="49" charset="0"/>
+              </a:rPr>
+              <a:t>println</a:t>
+            </a:r>
+            <a:r>
+              <a:rPr lang="en-US" b="0" dirty="0">
+                <a:solidFill>
+                  <a:srgbClr val="DAE3E3"/>
+                </a:solidFill>
+                <a:effectLst/>
+                <a:latin typeface="Consolas" panose="020B0609020204030204" pitchFamily="49" charset="0"/>
+              </a:rPr>
+              <a:t>(</a:t>
+            </a:r>
+            <a:r>
+              <a:rPr lang="en-US" b="0" dirty="0">
+                <a:solidFill>
+                  <a:srgbClr val="7FCBCD"/>
+                </a:solidFill>
+                <a:effectLst/>
+                <a:latin typeface="Consolas" panose="020B0609020204030204" pitchFamily="49" charset="0"/>
+              </a:rPr>
+              <a:t>"2.4V"</a:t>
+            </a:r>
+            <a:r>
+              <a:rPr lang="en-US" b="0" dirty="0">
+                <a:solidFill>
+                  <a:srgbClr val="DAE3E3"/>
+                </a:solidFill>
+                <a:effectLst/>
+                <a:latin typeface="Consolas" panose="020B0609020204030204" pitchFamily="49" charset="0"/>
+              </a:rPr>
+              <a:t>); </a:t>
+            </a:r>
+            <a:r>
+              <a:rPr lang="en-US" b="0" dirty="0">
+                <a:solidFill>
+                  <a:srgbClr val="C586C0"/>
+                </a:solidFill>
+                <a:effectLst/>
+                <a:latin typeface="Consolas" panose="020B0609020204030204" pitchFamily="49" charset="0"/>
+              </a:rPr>
+              <a:t>break</a:t>
+            </a:r>
+            <a:r>
+              <a:rPr lang="en-US" b="0" dirty="0">
+                <a:solidFill>
+                  <a:srgbClr val="DAE3E3"/>
+                </a:solidFill>
+                <a:effectLst/>
+                <a:latin typeface="Consolas" panose="020B0609020204030204" pitchFamily="49" charset="0"/>
+              </a:rPr>
+              <a:t>;</a:t>
+            </a:r>
+          </a:p>
+          <a:p>
+            <a:pPr>
+              <a:lnSpc>
+                <a:spcPts val="1425"/>
+              </a:lnSpc>
+            </a:pPr>
+            <a:r>
+              <a:rPr lang="en-US" b="0" dirty="0">
+                <a:solidFill>
+                  <a:srgbClr val="DAE3E3"/>
+                </a:solidFill>
+                <a:effectLst/>
+                <a:latin typeface="Consolas" panose="020B0609020204030204" pitchFamily="49" charset="0"/>
+              </a:rPr>
+              <a:t>  </a:t>
+            </a:r>
             <a:r>
               <a:rPr lang="en-US" b="1" dirty="0">
                 <a:solidFill>
+                  <a:srgbClr val="DAE3E3"/>
+                </a:solidFill>
+                <a:effectLst/>
+                <a:latin typeface="Consolas" panose="020B0609020204030204" pitchFamily="49" charset="0"/>
+              </a:rPr>
+              <a:t>  </a:t>
+            </a:r>
+            <a:r>
+              <a:rPr lang="en-US" b="1" dirty="0">
+                <a:solidFill>
                   <a:srgbClr val="FF0000"/>
                 </a:solidFill>
-              </a:rPr>
-              <a:t>3.3V source from LVR and 2 x 10uF Caps</a:t>
-            </a:r>
-            <a:r>
-              <a:rPr lang="en-US" b="1" dirty="0"/>
-              <a:t>, 16 bit enc, 8x ADC gain, 50 ohm div</a:t>
-            </a:r>
-          </a:p>
-        </p:txBody>
-      </p:sp>
-      <p:sp>
-        <p:nvSpPr>
-          <p:cNvPr id="13" name="Rectangle 12">
-            <a:extLst>
-              <a:ext uri="{FF2B5EF4-FFF2-40B4-BE49-F238E27FC236}">
-                <a16:creationId xmlns:a16="http://schemas.microsoft.com/office/drawing/2014/main" id="{22C63E94-D092-C650-9D76-1E9A4B0C73C7}"/>
-              </a:ext>
-            </a:extLst>
-          </p:cNvPr>
-          <p:cNvSpPr/>
-          <p:nvPr/>
-        </p:nvSpPr>
-        <p:spPr>
-          <a:xfrm>
-            <a:off x="3096784" y="4624455"/>
-            <a:ext cx="415636" cy="1911927"/>
-          </a:xfrm>
-          <a:prstGeom prst="rect">
-            <a:avLst/>
-          </a:prstGeom>
-          <a:noFill/>
-          <a:ln>
-            <a:solidFill>
-              <a:srgbClr val="FF0000"/>
-            </a:solidFill>
-          </a:ln>
-        </p:spPr>
-        <p:style>
-          <a:lnRef idx="2">
-            <a:schemeClr val="accent1">
-              <a:shade val="15000"/>
-            </a:schemeClr>
-          </a:lnRef>
-          <a:fillRef idx="1">
-            <a:schemeClr val="accent1"/>
-          </a:fillRef>
-          <a:effectRef idx="0">
-            <a:schemeClr val="accent1"/>
-          </a:effectRef>
-          <a:fontRef idx="minor">
-            <a:schemeClr val="lt1"/>
-          </a:fontRef>
-        </p:style>
-        <p:txBody>
-          <a:bodyPr rtlCol="0" anchor="ctr"/>
-          <a:lstStyle/>
-          <a:p>
-            <a:pPr algn="ctr"/>
-            <a:endParaRPr lang="en-US"/>
-          </a:p>
-        </p:txBody>
-      </p:sp>
-      <p:sp>
-        <p:nvSpPr>
-          <p:cNvPr id="2" name="TextBox 1">
-            <a:extLst>
-              <a:ext uri="{FF2B5EF4-FFF2-40B4-BE49-F238E27FC236}">
-                <a16:creationId xmlns:a16="http://schemas.microsoft.com/office/drawing/2014/main" id="{46CCF047-999B-E766-4207-6F3532811F8E}"/>
-              </a:ext>
-            </a:extLst>
-          </p:cNvPr>
-          <p:cNvSpPr txBox="1"/>
-          <p:nvPr/>
-        </p:nvSpPr>
-        <p:spPr>
-          <a:xfrm>
-            <a:off x="5792349" y="117236"/>
-            <a:ext cx="5512960" cy="1200329"/>
-          </a:xfrm>
-          <a:prstGeom prst="rect">
-            <a:avLst/>
-          </a:prstGeom>
-          <a:noFill/>
-        </p:spPr>
-        <p:txBody>
-          <a:bodyPr wrap="square" rtlCol="0">
-            <a:spAutoFit/>
-          </a:bodyPr>
-          <a:lstStyle/>
-          <a:p>
+                <a:effectLst/>
+                <a:latin typeface="Consolas" panose="020B0609020204030204" pitchFamily="49" charset="0"/>
+              </a:rPr>
+              <a:t>case NAU7802_EXTERNAL:  </a:t>
+            </a:r>
+            <a:r>
+              <a:rPr lang="en-US" b="1" dirty="0" err="1">
+                <a:solidFill>
+                  <a:srgbClr val="FF0000"/>
+                </a:solidFill>
+                <a:effectLst/>
+                <a:latin typeface="Consolas" panose="020B0609020204030204" pitchFamily="49" charset="0"/>
+              </a:rPr>
+              <a:t>Serial.println</a:t>
+            </a:r>
             <a:r>
               <a:rPr lang="en-US" b="1" dirty="0">
                 <a:solidFill>
                   <a:srgbClr val="FF0000"/>
                 </a:solidFill>
-              </a:rPr>
-              <a:t>3.3V source from LVR and 2 x 10uF Caps</a:t>
-            </a:r>
-            <a:r>
-              <a:rPr lang="en-US" b="1" dirty="0"/>
-              <a:t>, 16 bit enc, 2x ADC gain (using diff input), 76x gain from LMC6482 (across gauge), 50 ohm div with 0.4 ohm strain gauge (see circuit)</a:t>
-            </a:r>
-          </a:p>
-        </p:txBody>
-      </p:sp>
-      <p:pic>
-        <p:nvPicPr>
-          <p:cNvPr id="5" name="Picture 4">
-            <a:extLst>
-              <a:ext uri="{FF2B5EF4-FFF2-40B4-BE49-F238E27FC236}">
-                <a16:creationId xmlns:a16="http://schemas.microsoft.com/office/drawing/2014/main" id="{7FD6E26B-2EE5-D52C-1187-6A19ED75A7FB}"/>
-              </a:ext>
-            </a:extLst>
-          </p:cNvPr>
-          <p:cNvPicPr>
-            <a:picLocks noChangeAspect="1"/>
-          </p:cNvPicPr>
-          <p:nvPr/>
-        </p:nvPicPr>
-        <p:blipFill>
-          <a:blip r:embed="rId3"/>
-          <a:stretch>
-            <a:fillRect/>
-          </a:stretch>
-        </p:blipFill>
-        <p:spPr>
-          <a:xfrm>
-            <a:off x="6292863" y="1317565"/>
-            <a:ext cx="3927636" cy="5114917"/>
-          </a:xfrm>
-          <a:prstGeom prst="rect">
-            <a:avLst/>
-          </a:prstGeom>
-        </p:spPr>
-      </p:pic>
-      <p:sp>
-        <p:nvSpPr>
-          <p:cNvPr id="7" name="Rectangle 6">
-            <a:extLst>
-              <a:ext uri="{FF2B5EF4-FFF2-40B4-BE49-F238E27FC236}">
-                <a16:creationId xmlns:a16="http://schemas.microsoft.com/office/drawing/2014/main" id="{D76A7EDB-7D75-6EF0-618A-F6FA99A6A4E2}"/>
-              </a:ext>
-            </a:extLst>
-          </p:cNvPr>
-          <p:cNvSpPr/>
-          <p:nvPr/>
-        </p:nvSpPr>
-        <p:spPr>
-          <a:xfrm>
-            <a:off x="9001591" y="4584471"/>
-            <a:ext cx="415636" cy="1911927"/>
-          </a:xfrm>
-          <a:prstGeom prst="rect">
-            <a:avLst/>
-          </a:prstGeom>
-          <a:noFill/>
-          <a:ln>
-            <a:solidFill>
-              <a:srgbClr val="FF0000"/>
-            </a:solidFill>
-          </a:ln>
-        </p:spPr>
-        <p:style>
-          <a:lnRef idx="2">
-            <a:schemeClr val="accent1">
-              <a:shade val="15000"/>
-            </a:schemeClr>
-          </a:lnRef>
-          <a:fillRef idx="1">
-            <a:schemeClr val="accent1"/>
-          </a:fillRef>
-          <a:effectRef idx="0">
-            <a:schemeClr val="accent1"/>
-          </a:effectRef>
-          <a:fontRef idx="minor">
-            <a:schemeClr val="lt1"/>
-          </a:fontRef>
-        </p:style>
-        <p:txBody>
-          <a:bodyPr rtlCol="0" anchor="ctr"/>
-          <a:lstStyle/>
-          <a:p>
-            <a:pPr algn="ctr"/>
-            <a:endParaRPr lang="en-US"/>
+                <a:effectLst/>
+                <a:latin typeface="Consolas" panose="020B0609020204030204" pitchFamily="49" charset="0"/>
+              </a:rPr>
+              <a:t>("External"); </a:t>
+            </a:r>
+            <a:r>
+              <a:rPr lang="en-US" b="0" dirty="0">
+                <a:solidFill>
+                  <a:srgbClr val="C586C0"/>
+                </a:solidFill>
+                <a:effectLst/>
+                <a:latin typeface="Consolas" panose="020B0609020204030204" pitchFamily="49" charset="0"/>
+              </a:rPr>
+              <a:t>break</a:t>
+            </a:r>
+            <a:r>
+              <a:rPr lang="en-US" b="0" dirty="0">
+                <a:solidFill>
+                  <a:srgbClr val="DAE3E3"/>
+                </a:solidFill>
+                <a:effectLst/>
+                <a:latin typeface="Consolas" panose="020B0609020204030204" pitchFamily="49" charset="0"/>
+              </a:rPr>
+              <a:t>;</a:t>
+            </a:r>
           </a:p>
         </p:txBody>
       </p:sp>
     </p:spTree>
     <p:extLst>
       <p:ext uri="{BB962C8B-B14F-4D97-AF65-F5344CB8AC3E}">
-        <p14:creationId xmlns:p14="http://schemas.microsoft.com/office/powerpoint/2010/main" val="289257297"/>
+        <p14:creationId xmlns:p14="http://schemas.microsoft.com/office/powerpoint/2010/main" val="2828774177"/>
       </p:ext>
     </p:extLst>
   </p:cSld>

</xml_diff>